<commit_message>
Update  3 - JavaScript Tutorial.pptx
</commit_message>
<xml_diff>
--- a/frontend-cursus/ 3 - JavaScript Tutorial.pptx
+++ b/frontend-cursus/ 3 - JavaScript Tutorial.pptx
@@ -7870,6 +7870,63 @@
             </a:r>
           </a:p>
           <a:p>
+            <a:pPr marL="180975" indent="0" algn="ctr">
+              <a:buNone/>
+            </a:pPr>
+            <a:r>
+              <a:rPr lang="en-US" b="1" dirty="0">
+                <a:solidFill>
+                  <a:srgbClr val="00B0F0"/>
+                </a:solidFill>
+                <a:highlight>
+                  <a:srgbClr val="FFFF00"/>
+                </a:highlight>
+              </a:rPr>
+              <a:t>https://</a:t>
+            </a:r>
+            <a:r>
+              <a:rPr lang="en-US" b="1" dirty="0" err="1">
+                <a:solidFill>
+                  <a:srgbClr val="00B0F0"/>
+                </a:solidFill>
+                <a:highlight>
+                  <a:srgbClr val="FFFF00"/>
+                </a:highlight>
+              </a:rPr>
+              <a:t>www.codecademy.com</a:t>
+            </a:r>
+            <a:r>
+              <a:rPr lang="en-US" b="1" dirty="0">
+                <a:solidFill>
+                  <a:srgbClr val="00B0F0"/>
+                </a:solidFill>
+                <a:highlight>
+                  <a:srgbClr val="FFFF00"/>
+                </a:highlight>
+              </a:rPr>
+              <a:t>/learn/introduction-to-</a:t>
+            </a:r>
+            <a:r>
+              <a:rPr lang="en-US" b="1" dirty="0" err="1">
+                <a:solidFill>
+                  <a:srgbClr val="00B0F0"/>
+                </a:solidFill>
+                <a:highlight>
+                  <a:srgbClr val="FFFF00"/>
+                </a:highlight>
+              </a:rPr>
+              <a:t>javascript</a:t>
+            </a:r>
+            <a:endParaRPr lang="en-US" b="1" dirty="0">
+              <a:solidFill>
+                <a:srgbClr val="00B0F0"/>
+              </a:solidFill>
+              <a:highlight>
+                <a:srgbClr val="FFFF00"/>
+              </a:highlight>
+            </a:endParaRPr>
+          </a:p>
+          <a:p>
             <a:pPr lvl="0" algn="ctr">
               <a:spcBef>
                 <a:spcPts val="0"/>
@@ -7897,20 +7954,26 @@
                 <a:highlight>
                   <a:srgbClr val="FFFF00"/>
                 </a:highlight>
+                <a:hlinkClick r:id="rId3"/>
               </a:rPr>
-              <a:t>https://</a:t>
+              <a:t>https://www.learn-js.org</a:t>
             </a:r>
-            <a:r>
-              <a:rPr lang="en-US" b="1" dirty="0" err="1">
-                <a:solidFill>
-                  <a:schemeClr val="tx1"/>
-                </a:solidFill>
-                <a:highlight>
-                  <a:srgbClr val="FFFF00"/>
-                </a:highlight>
-              </a:rPr>
-              <a:t>www.learn-js.org</a:t>
-            </a:r>
+            <a:endParaRPr lang="en-US" b="1" dirty="0">
+              <a:solidFill>
+                <a:schemeClr val="tx1"/>
+              </a:solidFill>
+              <a:highlight>
+                <a:srgbClr val="FFFF00"/>
+              </a:highlight>
+            </a:endParaRPr>
+          </a:p>
+          <a:p>
+            <a:pPr lvl="0" algn="ctr">
+              <a:spcBef>
+                <a:spcPts val="0"/>
+              </a:spcBef>
+              <a:buNone/>
+            </a:pPr>
             <a:endParaRPr lang="en-US" b="1" dirty="0">
               <a:solidFill>
                 <a:schemeClr val="tx1"/>
@@ -7971,7 +8034,7 @@
                 <a:highlight>
                   <a:srgbClr val="FFFF00"/>
                 </a:highlight>
-                <a:hlinkClick r:id="rId3">
+                <a:hlinkClick r:id="rId4">
                   <a:extLst>
                     <a:ext uri="{A12FA001-AC4F-418D-AE19-62706E023703}">
                       <ahyp:hlinkClr xmlns:ahyp="http://schemas.microsoft.com/office/drawing/2018/hyperlinkcolor" val="tx"/>

</xml_diff>